<commit_message>
Corrections to lab intro
</commit_message>
<xml_diff>
--- a/help/Lab intro.pptx
+++ b/help/Lab intro.pptx
@@ -13,7 +13,7 @@
     <p:sldId id="2076136776" r:id="rId4"/>
     <p:sldId id="2076136909" r:id="rId5"/>
     <p:sldId id="2076136915" r:id="rId6"/>
-    <p:sldId id="2076136917" r:id="rId7"/>
+    <p:sldId id="2076136924" r:id="rId7"/>
     <p:sldId id="2076136922" r:id="rId8"/>
     <p:sldId id="2076136923" r:id="rId9"/>
   </p:sldIdLst>
@@ -1408,71 +1408,12 @@
           <a:bodyPr/>
           <a:lstStyle/>
           <a:p>
-            <a:pPr marL="0" marR="0" lvl="0" indent="0" algn="r" defTabSz="914400" rtl="0" eaLnBrk="1" fontAlgn="auto" latinLnBrk="0" hangingPunct="1">
-              <a:lnSpc>
-                <a:spcPct val="100000"/>
-              </a:lnSpc>
-              <a:spcBef>
-                <a:spcPts val="0"/>
-              </a:spcBef>
-              <a:spcAft>
-                <a:spcPts val="0"/>
-              </a:spcAft>
-              <a:buClrTx/>
-              <a:buSzTx/>
-              <a:buFontTx/>
-              <a:buNone/>
-              <a:tabLst/>
-              <a:defRPr/>
-            </a:pPr>
             <a:fld id="{A16CFAD1-D197-4A88-B173-A6412E995EE5}" type="slidenum">
-              <a:rPr kumimoji="0" lang="en-GB" sz="1000" b="0" i="0" u="none" strike="noStrike" kern="1200" cap="none" spc="0" normalizeH="0" baseline="0" noProof="0" smtClean="0">
-                <a:ln>
-                  <a:noFill/>
-                </a:ln>
-                <a:solidFill>
-                  <a:prstClr val="black"/>
-                </a:solidFill>
-                <a:effectLst/>
-                <a:uLnTx/>
-                <a:uFillTx/>
-                <a:latin typeface="Arial"/>
-                <a:ea typeface="+mn-ea"/>
-                <a:cs typeface="+mn-cs"/>
-              </a:rPr>
-              <a:pPr marL="0" marR="0" lvl="0" indent="0" algn="r" defTabSz="914400" rtl="0" eaLnBrk="1" fontAlgn="auto" latinLnBrk="0" hangingPunct="1">
-                <a:lnSpc>
-                  <a:spcPct val="100000"/>
-                </a:lnSpc>
-                <a:spcBef>
-                  <a:spcPts val="0"/>
-                </a:spcBef>
-                <a:spcAft>
-                  <a:spcPts val="0"/>
-                </a:spcAft>
-                <a:buClrTx/>
-                <a:buSzTx/>
-                <a:buFontTx/>
-                <a:buNone/>
-                <a:tabLst/>
-                <a:defRPr/>
-              </a:pPr>
+              <a:rPr lang="en-GB" smtClean="0"/>
+              <a:pPr/>
               <a:t>5</a:t>
             </a:fld>
-            <a:endParaRPr kumimoji="0" lang="en-GB" sz="1000" b="0" i="0" u="none" strike="noStrike" kern="1200" cap="none" spc="0" normalizeH="0" baseline="0" noProof="0">
-              <a:ln>
-                <a:noFill/>
-              </a:ln>
-              <a:solidFill>
-                <a:prstClr val="black"/>
-              </a:solidFill>
-              <a:effectLst/>
-              <a:uLnTx/>
-              <a:uFillTx/>
-              <a:latin typeface="Arial"/>
-              <a:ea typeface="+mn-ea"/>
-              <a:cs typeface="+mn-cs"/>
-            </a:endParaRPr>
+            <a:endParaRPr lang="en-GB"/>
           </a:p>
         </p:txBody>
       </p:sp>
@@ -1552,71 +1493,12 @@
           <a:bodyPr/>
           <a:lstStyle/>
           <a:p>
-            <a:pPr marL="0" marR="0" lvl="0" indent="0" algn="r" defTabSz="914400" rtl="0" eaLnBrk="1" fontAlgn="auto" latinLnBrk="0" hangingPunct="1">
-              <a:lnSpc>
-                <a:spcPct val="100000"/>
-              </a:lnSpc>
-              <a:spcBef>
-                <a:spcPts val="0"/>
-              </a:spcBef>
-              <a:spcAft>
-                <a:spcPts val="0"/>
-              </a:spcAft>
-              <a:buClrTx/>
-              <a:buSzTx/>
-              <a:buFontTx/>
-              <a:buNone/>
-              <a:tabLst/>
-              <a:defRPr/>
-            </a:pPr>
             <a:fld id="{A16CFAD1-D197-4A88-B173-A6412E995EE5}" type="slidenum">
-              <a:rPr kumimoji="0" lang="en-GB" sz="1000" b="0" i="0" u="none" strike="noStrike" kern="1200" cap="none" spc="0" normalizeH="0" baseline="0" noProof="0" smtClean="0">
-                <a:ln>
-                  <a:noFill/>
-                </a:ln>
-                <a:solidFill>
-                  <a:prstClr val="black"/>
-                </a:solidFill>
-                <a:effectLst/>
-                <a:uLnTx/>
-                <a:uFillTx/>
-                <a:latin typeface="Arial"/>
-                <a:ea typeface="+mn-ea"/>
-                <a:cs typeface="+mn-cs"/>
-              </a:rPr>
-              <a:pPr marL="0" marR="0" lvl="0" indent="0" algn="r" defTabSz="914400" rtl="0" eaLnBrk="1" fontAlgn="auto" latinLnBrk="0" hangingPunct="1">
-                <a:lnSpc>
-                  <a:spcPct val="100000"/>
-                </a:lnSpc>
-                <a:spcBef>
-                  <a:spcPts val="0"/>
-                </a:spcBef>
-                <a:spcAft>
-                  <a:spcPts val="0"/>
-                </a:spcAft>
-                <a:buClrTx/>
-                <a:buSzTx/>
-                <a:buFontTx/>
-                <a:buNone/>
-                <a:tabLst/>
-                <a:defRPr/>
-              </a:pPr>
+              <a:rPr lang="en-GB" smtClean="0"/>
+              <a:pPr/>
               <a:t>6</a:t>
             </a:fld>
-            <a:endParaRPr kumimoji="0" lang="en-GB" sz="1000" b="0" i="0" u="none" strike="noStrike" kern="1200" cap="none" spc="0" normalizeH="0" baseline="0" noProof="0">
-              <a:ln>
-                <a:noFill/>
-              </a:ln>
-              <a:solidFill>
-                <a:prstClr val="black"/>
-              </a:solidFill>
-              <a:effectLst/>
-              <a:uLnTx/>
-              <a:uFillTx/>
-              <a:latin typeface="Arial"/>
-              <a:ea typeface="+mn-ea"/>
-              <a:cs typeface="+mn-cs"/>
-            </a:endParaRPr>
+            <a:endParaRPr lang="en-GB"/>
           </a:p>
         </p:txBody>
       </p:sp>
@@ -25594,85 +25476,85 @@
               <a:buNone/>
             </a:pPr>
             <a:r>
-              <a:rPr lang="en-US" sz="1800" b="1" dirty="0" err="1"/>
+              <a:rPr lang="en-US" sz="1600" b="1" dirty="0" err="1"/>
               <a:t>Skriv</a:t>
             </a:r>
             <a:r>
-              <a:rPr lang="en-US" sz="1800" b="1" dirty="0"/>
+              <a:rPr lang="en-US" sz="1600" b="1" dirty="0"/>
               <a:t> </a:t>
             </a:r>
             <a:r>
-              <a:rPr lang="en-US" sz="1800" b="1" dirty="0" err="1"/>
+              <a:rPr lang="en-US" sz="1600" b="1" dirty="0" err="1"/>
               <a:t>på</a:t>
             </a:r>
             <a:r>
-              <a:rPr lang="en-US" sz="1800" b="1" dirty="0"/>
+              <a:rPr lang="en-US" sz="1600" b="1" dirty="0"/>
               <a:t> teams</a:t>
             </a:r>
             <a:r>
-              <a:rPr lang="en-US" sz="1800" dirty="0"/>
+              <a:rPr lang="en-US" sz="1600" dirty="0"/>
               <a:t>. Vi </a:t>
             </a:r>
             <a:r>
-              <a:rPr lang="en-US" sz="1800" dirty="0" err="1"/>
+              <a:rPr lang="en-US" sz="1600" dirty="0" err="1"/>
               <a:t>forsøger</a:t>
             </a:r>
             <a:r>
-              <a:rPr lang="en-US" sz="1800" dirty="0"/>
+              <a:rPr lang="en-US" sz="1600" dirty="0"/>
               <a:t> at </a:t>
             </a:r>
             <a:r>
-              <a:rPr lang="en-US" sz="1800" dirty="0" err="1"/>
+              <a:rPr lang="en-US" sz="1600" dirty="0" err="1"/>
               <a:t>hjælpe</a:t>
             </a:r>
             <a:r>
-              <a:rPr lang="en-US" sz="1800" dirty="0"/>
+              <a:rPr lang="en-US" sz="1600" dirty="0"/>
               <a:t> </a:t>
             </a:r>
             <a:r>
-              <a:rPr lang="en-US" sz="1800" dirty="0" err="1"/>
+              <a:rPr lang="en-US" sz="1600" dirty="0" err="1"/>
               <a:t>så</a:t>
             </a:r>
             <a:r>
-              <a:rPr lang="en-US" sz="1800" dirty="0"/>
+              <a:rPr lang="en-US" sz="1600" dirty="0"/>
               <a:t> </a:t>
             </a:r>
             <a:r>
-              <a:rPr lang="en-US" sz="1800" dirty="0" err="1"/>
+              <a:rPr lang="en-US" sz="1600" dirty="0" err="1"/>
               <a:t>hurtigt</a:t>
             </a:r>
             <a:r>
-              <a:rPr lang="en-US" sz="1800" dirty="0"/>
+              <a:rPr lang="en-US" sz="1600" dirty="0"/>
               <a:t> </a:t>
             </a:r>
             <a:r>
-              <a:rPr lang="en-US" sz="1800" dirty="0" err="1"/>
+              <a:rPr lang="en-US" sz="1600" dirty="0" err="1"/>
               <a:t>som</a:t>
             </a:r>
             <a:r>
-              <a:rPr lang="en-US" sz="1800" dirty="0"/>
+              <a:rPr lang="en-US" sz="1600" dirty="0"/>
               <a:t> </a:t>
             </a:r>
             <a:r>
-              <a:rPr lang="en-US" sz="1800" dirty="0" err="1"/>
+              <a:rPr lang="en-US" sz="1600" dirty="0" err="1"/>
               <a:t>muligt</a:t>
             </a:r>
             <a:r>
-              <a:rPr lang="en-US" sz="1800" dirty="0"/>
+              <a:rPr lang="en-US" sz="1600" dirty="0"/>
               <a:t>.</a:t>
             </a:r>
-            <a:endParaRPr lang="en-US" sz="1800" i="1" dirty="0"/>
+            <a:endParaRPr lang="en-US" sz="1600" i="1" dirty="0"/>
           </a:p>
           <a:p>
             <a:pPr marL="0" indent="0">
               <a:buNone/>
             </a:pPr>
             <a:r>
-              <a:rPr lang="en-US" sz="1600" b="1" dirty="0" err="1"/>
+              <a:rPr lang="en-US" sz="1400" b="1" dirty="0" err="1"/>
               <a:t>Imens</a:t>
             </a:r>
             <a:r>
-              <a:rPr lang="en-US" sz="1600" b="1" dirty="0"/>
+              <a:rPr lang="en-US" sz="1400" b="1" dirty="0"/>
               <a:t> du venter</a:t>
             </a:r>
           </a:p>
@@ -25682,106 +25564,136 @@
               <a:buAutoNum type="arabicPeriod"/>
             </a:pPr>
             <a:r>
-              <a:rPr lang="en-US" sz="1600" dirty="0"/>
+              <a:rPr lang="en-US" sz="1400" dirty="0"/>
               <a:t>Se lab-</a:t>
             </a:r>
             <a:r>
-              <a:rPr lang="en-US" sz="1600" dirty="0" err="1"/>
+              <a:rPr lang="en-US" sz="1400" dirty="0" err="1"/>
               <a:t>vejledningen</a:t>
             </a:r>
             <a:r>
-              <a:rPr lang="en-US" sz="1600" dirty="0"/>
+              <a:rPr lang="en-US" sz="1400" dirty="0"/>
               <a:t> </a:t>
             </a:r>
             <a:r>
-              <a:rPr lang="en-US" sz="1600" dirty="0" err="1"/>
+              <a:rPr lang="en-US" sz="1400" dirty="0" err="1"/>
               <a:t>i</a:t>
             </a:r>
             <a:r>
-              <a:rPr lang="en-US" sz="1600" dirty="0"/>
+              <a:rPr lang="en-US" sz="1400" dirty="0"/>
               <a:t> sin </a:t>
             </a:r>
             <a:r>
-              <a:rPr lang="en-US" sz="1600" dirty="0" err="1"/>
+              <a:rPr lang="en-US" sz="1400" dirty="0" err="1"/>
               <a:t>helhed</a:t>
             </a:r>
             <a:r>
-              <a:rPr lang="en-US" sz="1600" dirty="0"/>
+              <a:rPr lang="en-US" sz="1400" dirty="0"/>
               <a:t> </a:t>
             </a:r>
             <a:r>
-              <a:rPr lang="en-US" sz="1600" dirty="0" err="1"/>
+              <a:rPr lang="en-US" sz="1400" dirty="0" err="1"/>
               <a:t>i</a:t>
             </a:r>
             <a:r>
-              <a:rPr lang="en-US" sz="1600" dirty="0"/>
+              <a:rPr lang="en-US" sz="1400" dirty="0"/>
               <a:t> MS repository. Her </a:t>
             </a:r>
             <a:r>
-              <a:rPr lang="en-US" sz="1600" dirty="0" err="1"/>
+              <a:rPr lang="en-US" sz="1400" dirty="0" err="1"/>
               <a:t>kan</a:t>
             </a:r>
             <a:r>
-              <a:rPr lang="en-US" sz="1600" dirty="0"/>
+              <a:rPr lang="en-US" sz="1400" dirty="0"/>
               <a:t> der </a:t>
             </a:r>
             <a:r>
-              <a:rPr lang="en-US" sz="1600" dirty="0" err="1"/>
+              <a:rPr lang="en-US" sz="1400" dirty="0" err="1"/>
               <a:t>være</a:t>
             </a:r>
             <a:r>
-              <a:rPr lang="en-US" sz="1600" dirty="0"/>
+              <a:rPr lang="en-US" sz="1400" dirty="0"/>
               <a:t> </a:t>
             </a:r>
             <a:r>
-              <a:rPr lang="en-US" sz="1600" dirty="0" err="1"/>
+              <a:rPr lang="en-US" sz="1400" dirty="0" err="1"/>
               <a:t>rettelser</a:t>
             </a:r>
             <a:r>
-              <a:rPr lang="en-US" sz="1600" dirty="0"/>
+              <a:rPr lang="en-US" sz="1400" dirty="0"/>
               <a:t>, </a:t>
             </a:r>
             <a:r>
-              <a:rPr lang="en-US" sz="1600" dirty="0" err="1"/>
+              <a:rPr lang="en-US" sz="1400" dirty="0" err="1"/>
               <a:t>som</a:t>
             </a:r>
             <a:r>
-              <a:rPr lang="en-US" sz="1600" dirty="0"/>
+              <a:rPr lang="en-US" sz="1400" dirty="0"/>
               <a:t> </a:t>
             </a:r>
             <a:r>
-              <a:rPr lang="en-US" sz="1600" dirty="0" err="1"/>
+              <a:rPr lang="en-US" sz="1400" dirty="0" err="1"/>
               <a:t>ikke</a:t>
             </a:r>
             <a:r>
-              <a:rPr lang="en-US" sz="1600" dirty="0"/>
+              <a:rPr lang="en-US" sz="1400" dirty="0"/>
               <a:t> er </a:t>
             </a:r>
             <a:r>
-              <a:rPr lang="en-US" sz="1600" dirty="0" err="1"/>
+              <a:rPr lang="en-US" sz="1400" dirty="0" err="1"/>
               <a:t>i</a:t>
             </a:r>
             <a:r>
-              <a:rPr lang="en-US" sz="1600" dirty="0"/>
+              <a:rPr lang="en-US" sz="1400" dirty="0"/>
               <a:t> lab-</a:t>
             </a:r>
             <a:r>
-              <a:rPr lang="en-US" sz="1600" dirty="0" err="1"/>
+              <a:rPr lang="en-US" sz="1400" dirty="0" err="1"/>
               <a:t>vejledningen</a:t>
             </a:r>
             <a:r>
-              <a:rPr lang="en-US" sz="1600" dirty="0"/>
-              <a:t>: </a:t>
-            </a:r>
-            <a:r>
-              <a:rPr lang="en-US" sz="1600" dirty="0">
+              <a:rPr lang="en-US" sz="1400" dirty="0"/>
+              <a:t>:</a:t>
+            </a:r>
+          </a:p>
+          <a:p>
+            <a:pPr marL="637200" lvl="1" indent="-457200">
+              <a:buFont typeface="+mj-lt"/>
+              <a:buAutoNum type="alphaLcPeriod"/>
+            </a:pPr>
+            <a:r>
+              <a:rPr lang="da-DK" sz="1400" dirty="0"/>
+              <a:t>Del 1: </a:t>
+            </a:r>
+            <a:r>
+              <a:rPr lang="da-DK" sz="1400" dirty="0">
                 <a:hlinkClick r:id="rId3"/>
               </a:rPr>
+              <a:t>https://github.com/microsoft/MCW-Cloud-native-applications/blob/master/Hands-on%20lab/Before%20the%20HOL%20-%20Cloud-native%20applications.md</a:t>
+            </a:r>
+            <a:r>
+              <a:rPr lang="da-DK" sz="1400" dirty="0"/>
+              <a:t>  </a:t>
+            </a:r>
+          </a:p>
+          <a:p>
+            <a:pPr marL="637200" lvl="1" indent="-457200">
+              <a:buFont typeface="+mj-lt"/>
+              <a:buAutoNum type="alphaLcPeriod"/>
+            </a:pPr>
+            <a:r>
+              <a:rPr lang="en-US" sz="1400" dirty="0"/>
+              <a:t>Del 2: </a:t>
+            </a:r>
+            <a:r>
+              <a:rPr lang="en-US" sz="1400" dirty="0">
+                <a:hlinkClick r:id="rId4"/>
+              </a:rPr>
               <a:t>https://github.com/microsoft/MCW-Cloud-native-applications/blob/master/Hands-on%20lab/HOL%20step-by-step%20-%20Cloud-native%20applications%20-%20Developer%20edition.md</a:t>
             </a:r>
             <a:r>
-              <a:rPr lang="en-US" sz="1600" dirty="0"/>
-              <a:t> </a:t>
+              <a:rPr lang="en-US" sz="1400" dirty="0"/>
+              <a:t>  </a:t>
             </a:r>
           </a:p>
           <a:p>
@@ -25790,33 +25702,33 @@
               <a:buAutoNum type="arabicPeriod"/>
             </a:pPr>
             <a:r>
-              <a:rPr lang="en-US" sz="1600" dirty="0"/>
+              <a:rPr lang="en-US" sz="1400" dirty="0"/>
               <a:t>Se </a:t>
             </a:r>
             <a:r>
-              <a:rPr lang="en-US" sz="1600" dirty="0" err="1"/>
+              <a:rPr lang="en-US" sz="1400" dirty="0" err="1"/>
               <a:t>i</a:t>
             </a:r>
             <a:r>
-              <a:rPr lang="en-US" sz="1600" dirty="0"/>
+              <a:rPr lang="en-US" sz="1400" dirty="0"/>
               <a:t> </a:t>
             </a:r>
             <a:r>
-              <a:rPr lang="en-US" sz="1600" dirty="0" err="1"/>
+              <a:rPr lang="en-US" sz="1400" dirty="0" err="1"/>
               <a:t>vores</a:t>
             </a:r>
             <a:r>
-              <a:rPr lang="en-US" sz="1600" dirty="0"/>
+              <a:rPr lang="en-US" sz="1400" dirty="0"/>
               <a:t> “Lab help guide”: </a:t>
             </a:r>
             <a:r>
-              <a:rPr lang="en-US" sz="1600" dirty="0">
-                <a:hlinkClick r:id="rId4"/>
+              <a:rPr lang="en-US" sz="1400" dirty="0">
+                <a:hlinkClick r:id="rId5"/>
               </a:rPr>
               <a:t>https://github.com/immeorfj/Fabmedical/blob/master/help/Lab%20help%20guide.pdf</a:t>
             </a:r>
             <a:r>
-              <a:rPr lang="en-US" sz="1600" dirty="0"/>
+              <a:rPr lang="en-US" sz="1400" dirty="0"/>
               <a:t> </a:t>
             </a:r>
           </a:p>
@@ -25826,32 +25738,32 @@
               <a:buAutoNum type="arabicPeriod"/>
             </a:pPr>
             <a:r>
-              <a:rPr lang="en-US" sz="1600" dirty="0"/>
+              <a:rPr lang="en-US" sz="1400" dirty="0"/>
               <a:t>Se </a:t>
             </a:r>
             <a:r>
-              <a:rPr lang="en-US" sz="1600" dirty="0" err="1"/>
+              <a:rPr lang="en-US" sz="1400" dirty="0" err="1"/>
               <a:t>i</a:t>
             </a:r>
             <a:r>
-              <a:rPr lang="en-US" sz="1600" dirty="0"/>
+              <a:rPr lang="en-US" sz="1400" dirty="0"/>
               <a:t> </a:t>
             </a:r>
             <a:r>
-              <a:rPr lang="en-US" sz="1600" dirty="0" err="1"/>
+              <a:rPr lang="en-US" sz="1400" dirty="0" err="1"/>
               <a:t>vores</a:t>
             </a:r>
             <a:r>
-              <a:rPr lang="en-US" sz="1600" dirty="0"/>
+              <a:rPr lang="en-US" sz="1400" dirty="0"/>
               <a:t> reference repository: </a:t>
             </a:r>
             <a:r>
-              <a:rPr lang="en-US" sz="1600" dirty="0">
-                <a:hlinkClick r:id="rId5"/>
+              <a:rPr lang="en-US" sz="1400" dirty="0">
+                <a:hlinkClick r:id="rId6"/>
               </a:rPr>
               <a:t>https://github.com/immeorfj/Fabmedical</a:t>
             </a:r>
-            <a:endParaRPr lang="en-US" sz="1600" dirty="0"/>
+            <a:endParaRPr lang="en-US" sz="1400" dirty="0"/>
           </a:p>
           <a:p>
             <a:pPr marL="457200" indent="-457200">
@@ -25859,56 +25771,56 @@
               <a:buAutoNum type="arabicPeriod"/>
             </a:pPr>
             <a:r>
-              <a:rPr lang="en-US" sz="1600" dirty="0"/>
+              <a:rPr lang="en-US" sz="1400" dirty="0"/>
               <a:t>Se </a:t>
             </a:r>
             <a:r>
-              <a:rPr lang="en-US" sz="1600" dirty="0" err="1"/>
+              <a:rPr lang="en-US" sz="1400" dirty="0" err="1"/>
               <a:t>eksempel</a:t>
             </a:r>
             <a:r>
-              <a:rPr lang="en-US" sz="1600" dirty="0"/>
+              <a:rPr lang="en-US" sz="1400" dirty="0"/>
               <a:t> filer, </a:t>
             </a:r>
             <a:r>
-              <a:rPr lang="en-US" sz="1600" dirty="0" err="1"/>
+              <a:rPr lang="en-US" sz="1400" dirty="0" err="1"/>
               <a:t>hvor</a:t>
             </a:r>
             <a:r>
-              <a:rPr lang="en-US" sz="1600" dirty="0"/>
+              <a:rPr lang="en-US" sz="1400" dirty="0"/>
               <a:t> </a:t>
             </a:r>
             <a:r>
-              <a:rPr lang="en-US" sz="1600" dirty="0" err="1"/>
+              <a:rPr lang="en-US" sz="1400" dirty="0" err="1"/>
               <a:t>miljøspecifikke</a:t>
             </a:r>
             <a:r>
-              <a:rPr lang="en-US" sz="1600" dirty="0"/>
+              <a:rPr lang="en-US" sz="1400" dirty="0"/>
               <a:t> reference </a:t>
             </a:r>
             <a:r>
-              <a:rPr lang="en-US" sz="1600" dirty="0" err="1"/>
+              <a:rPr lang="en-US" sz="1400" dirty="0" err="1"/>
               <a:t>skal</a:t>
             </a:r>
             <a:r>
-              <a:rPr lang="en-US" sz="1600" dirty="0"/>
+              <a:rPr lang="en-US" sz="1400" dirty="0"/>
               <a:t> </a:t>
             </a:r>
             <a:r>
-              <a:rPr lang="en-US" sz="1600" dirty="0" err="1"/>
+              <a:rPr lang="en-US" sz="1400" dirty="0" err="1"/>
               <a:t>erstattes</a:t>
             </a:r>
             <a:r>
-              <a:rPr lang="en-US" sz="1600" dirty="0"/>
+              <a:rPr lang="en-US" sz="1400" dirty="0"/>
               <a:t>: </a:t>
             </a:r>
             <a:r>
-              <a:rPr lang="en-US" sz="1600" dirty="0">
-                <a:hlinkClick r:id="rId6"/>
+              <a:rPr lang="en-US" sz="1400" dirty="0">
+                <a:hlinkClick r:id="rId7"/>
               </a:rPr>
               <a:t>https://github.com/immeorfj/Fabmedical/tree/master/help/files</a:t>
             </a:r>
-            <a:endParaRPr lang="en-US" sz="1600" dirty="0"/>
+            <a:endParaRPr lang="en-US" sz="1400" dirty="0"/>
           </a:p>
           <a:p>
             <a:pPr marL="457200" indent="-457200">
@@ -25954,21 +25866,21 @@
               <a:buNone/>
             </a:pPr>
             <a:r>
-              <a:rPr lang="en-US" sz="1800" b="1" dirty="0">
+              <a:rPr lang="en-US" sz="1400" b="1" dirty="0">
                 <a:effectLst/>
                 <a:latin typeface="Calibri" panose="020F0502020204030204" pitchFamily="34" charset="0"/>
               </a:rPr>
               <a:t>Teams: </a:t>
             </a:r>
             <a:r>
-              <a:rPr lang="en-US" sz="1800" dirty="0">
+              <a:rPr lang="en-US" sz="1400" dirty="0">
                 <a:effectLst/>
                 <a:latin typeface="Calibri" panose="020F0502020204030204" pitchFamily="34" charset="0"/>
-                <a:hlinkClick r:id="rId7"/>
+                <a:hlinkClick r:id="rId8"/>
               </a:rPr>
               <a:t>http://bit.ly/cloudlabs-support</a:t>
             </a:r>
-            <a:endParaRPr lang="en-US" sz="1800" dirty="0">
+            <a:endParaRPr lang="en-US" sz="1400" dirty="0">
               <a:effectLst/>
               <a:latin typeface="Calibri" panose="020F0502020204030204" pitchFamily="34" charset="0"/>
             </a:endParaRPr>
@@ -25984,29 +25896,29 @@
               <a:buNone/>
             </a:pPr>
             <a:r>
-              <a:rPr lang="en-US" sz="1800" b="1" dirty="0">
+              <a:rPr lang="en-US" sz="1400" b="1" dirty="0">
                 <a:effectLst/>
                 <a:latin typeface="Calibri" panose="020F0502020204030204" pitchFamily="34" charset="0"/>
               </a:rPr>
               <a:t>Email:</a:t>
             </a:r>
             <a:r>
-              <a:rPr lang="en-US" sz="1800" dirty="0">
+              <a:rPr lang="en-US" sz="1400" dirty="0">
                 <a:effectLst/>
                 <a:latin typeface="Calibri" panose="020F0502020204030204" pitchFamily="34" charset="0"/>
               </a:rPr>
               <a:t> </a:t>
             </a:r>
             <a:r>
-              <a:rPr lang="en-US" sz="1800" dirty="0">
+              <a:rPr lang="en-US" sz="1400" dirty="0">
                 <a:effectLst/>
                 <a:latin typeface="Calibri" panose="020F0502020204030204" pitchFamily="34" charset="0"/>
-                <a:hlinkClick r:id="rId8"/>
+                <a:hlinkClick r:id="rId9"/>
               </a:rPr>
               <a:t>cloudlabs-support@spektrasystems.com</a:t>
             </a:r>
             <a:r>
-              <a:rPr lang="en-US" sz="1800" dirty="0">
+              <a:rPr lang="en-US" sz="1400" dirty="0">
                 <a:effectLst/>
                 <a:latin typeface="Calibri" panose="020F0502020204030204" pitchFamily="34" charset="0"/>
               </a:rPr>
@@ -26042,50 +25954,11 @@
           <a:bodyPr/>
           <a:lstStyle/>
           <a:p>
-            <a:pPr marL="0" marR="0" lvl="0" indent="0" algn="l" defTabSz="914400" rtl="0" eaLnBrk="1" fontAlgn="auto" latinLnBrk="0" hangingPunct="1">
-              <a:lnSpc>
-                <a:spcPct val="100000"/>
-              </a:lnSpc>
-              <a:spcBef>
-                <a:spcPts val="0"/>
-              </a:spcBef>
-              <a:spcAft>
-                <a:spcPts val="0"/>
-              </a:spcAft>
-              <a:buClrTx/>
-              <a:buSzTx/>
-              <a:buFontTx/>
-              <a:buNone/>
-              <a:tabLst/>
-              <a:defRPr/>
-            </a:pPr>
-            <a:r>
-              <a:rPr kumimoji="0" lang="da-DK" sz="100" b="0" i="0" u="none" strike="noStrike" kern="1200" cap="none" spc="0" normalizeH="0" baseline="0" noProof="0">
-                <a:ln>
-                  <a:noFill/>
-                </a:ln>
-                <a:noFill/>
-                <a:effectLst/>
-                <a:uLnTx/>
-                <a:uFillTx/>
-                <a:latin typeface="Arial"/>
-                <a:ea typeface="+mn-ea"/>
-                <a:cs typeface="+mn-cs"/>
-              </a:rPr>
+            <a:r>
+              <a:rPr lang="da-DK"/>
               <a:t>Lokation, 23-10-2019</a:t>
             </a:r>
-            <a:endParaRPr kumimoji="0" lang="da-DK" sz="100" b="0" i="0" u="none" strike="noStrike" kern="1200" cap="none" spc="0" normalizeH="0" baseline="0" noProof="0" dirty="0">
-              <a:ln>
-                <a:noFill/>
-              </a:ln>
-              <a:noFill/>
-              <a:effectLst/>
-              <a:uLnTx/>
-              <a:uFillTx/>
-              <a:latin typeface="Arial"/>
-              <a:ea typeface="+mn-ea"/>
-              <a:cs typeface="+mn-cs"/>
-            </a:endParaRPr>
+            <a:endParaRPr lang="da-DK" dirty="0"/>
           </a:p>
         </p:txBody>
       </p:sp>
@@ -26110,50 +25983,11 @@
           <a:bodyPr/>
           <a:lstStyle/>
           <a:p>
-            <a:pPr marL="0" marR="0" lvl="0" indent="0" algn="l" defTabSz="914400" rtl="0" eaLnBrk="1" fontAlgn="auto" latinLnBrk="0" hangingPunct="1">
-              <a:lnSpc>
-                <a:spcPct val="100000"/>
-              </a:lnSpc>
-              <a:spcBef>
-                <a:spcPts val="0"/>
-              </a:spcBef>
-              <a:spcAft>
-                <a:spcPts val="0"/>
-              </a:spcAft>
-              <a:buClrTx/>
-              <a:buSzTx/>
-              <a:buFontTx/>
-              <a:buNone/>
-              <a:tabLst/>
-              <a:defRPr/>
-            </a:pPr>
-            <a:r>
-              <a:rPr kumimoji="0" lang="da-DK" sz="100" b="0" i="0" u="none" strike="noStrike" kern="1200" cap="none" spc="0" normalizeH="0" baseline="0" noProof="0">
-                <a:ln>
-                  <a:noFill/>
-                </a:ln>
-                <a:noFill/>
-                <a:effectLst/>
-                <a:uLnTx/>
-                <a:uFillTx/>
-                <a:latin typeface="Arial"/>
-                <a:ea typeface="+mn-ea"/>
-                <a:cs typeface="+mn-cs"/>
-              </a:rPr>
+            <a:r>
+              <a:rPr lang="da-DK"/>
               <a:t>Kunde_immeo</a:t>
             </a:r>
-            <a:endParaRPr kumimoji="0" lang="da-DK" sz="100" b="0" i="0" u="none" strike="noStrike" kern="1200" cap="none" spc="0" normalizeH="0" baseline="0" noProof="0" dirty="0">
-              <a:ln>
-                <a:noFill/>
-              </a:ln>
-              <a:noFill/>
-              <a:effectLst/>
-              <a:uLnTx/>
-              <a:uFillTx/>
-              <a:latin typeface="Arial"/>
-              <a:ea typeface="+mn-ea"/>
-              <a:cs typeface="+mn-cs"/>
-            </a:endParaRPr>
+            <a:endParaRPr lang="da-DK" dirty="0"/>
           </a:p>
         </p:txBody>
       </p:sp>
@@ -26178,88 +26012,16 @@
           <a:bodyPr/>
           <a:lstStyle/>
           <a:p>
-            <a:pPr marL="0" marR="0" lvl="0" indent="0" algn="l" defTabSz="914400" rtl="0" eaLnBrk="1" fontAlgn="auto" latinLnBrk="0" hangingPunct="1">
-              <a:lnSpc>
-                <a:spcPct val="100000"/>
-              </a:lnSpc>
-              <a:spcBef>
-                <a:spcPts val="0"/>
-              </a:spcBef>
-              <a:spcAft>
-                <a:spcPts val="0"/>
-              </a:spcAft>
-              <a:buClrTx/>
-              <a:buSzTx/>
-              <a:buFontTx/>
-              <a:buNone/>
-              <a:tabLst/>
-              <a:defRPr/>
-            </a:pPr>
-            <a:r>
-              <a:rPr kumimoji="0" lang="da-DK" sz="800" b="0" i="0" u="none" strike="noStrike" kern="1200" cap="none" spc="0" normalizeH="0" baseline="0" noProof="0">
-                <a:ln>
-                  <a:noFill/>
-                </a:ln>
-                <a:solidFill>
-                  <a:srgbClr val="596A57"/>
-                </a:solidFill>
-                <a:effectLst/>
-                <a:uLnTx/>
-                <a:uFillTx/>
-                <a:latin typeface="Arial"/>
-                <a:ea typeface="+mn-ea"/>
-                <a:cs typeface="+mn-cs"/>
-              </a:rPr>
+            <a:r>
+              <a:rPr lang="da-DK"/>
               <a:t>s.</a:t>
             </a:r>
             <a:fld id="{24C8C45C-947F-4981-8B3F-4F32E973C901}" type="slidenum">
-              <a:rPr kumimoji="0" lang="da-DK" sz="800" b="0" i="0" u="none" strike="noStrike" kern="1200" cap="none" spc="0" normalizeH="0" baseline="0" noProof="0" smtClean="0">
-                <a:ln>
-                  <a:noFill/>
-                </a:ln>
-                <a:solidFill>
-                  <a:srgbClr val="596A57"/>
-                </a:solidFill>
-                <a:effectLst/>
-                <a:uLnTx/>
-                <a:uFillTx/>
-                <a:latin typeface="Arial"/>
-                <a:ea typeface="+mn-ea"/>
-                <a:cs typeface="+mn-cs"/>
-              </a:rPr>
-              <a:pPr marL="0" marR="0" lvl="0" indent="0" algn="l" defTabSz="914400" rtl="0" eaLnBrk="1" fontAlgn="auto" latinLnBrk="0" hangingPunct="1">
-                <a:lnSpc>
-                  <a:spcPct val="100000"/>
-                </a:lnSpc>
-                <a:spcBef>
-                  <a:spcPts val="0"/>
-                </a:spcBef>
-                <a:spcAft>
-                  <a:spcPts val="0"/>
-                </a:spcAft>
-                <a:buClrTx/>
-                <a:buSzTx/>
-                <a:buFontTx/>
-                <a:buNone/>
-                <a:tabLst/>
-                <a:defRPr/>
-              </a:pPr>
+              <a:rPr lang="da-DK" smtClean="0"/>
+              <a:pPr/>
               <a:t>5</a:t>
             </a:fld>
-            <a:endParaRPr kumimoji="0" lang="da-DK" sz="800" b="0" i="0" u="none" strike="noStrike" kern="1200" cap="none" spc="0" normalizeH="0" baseline="0" noProof="0" dirty="0">
-              <a:ln>
-                <a:noFill/>
-              </a:ln>
-              <a:solidFill>
-                <a:srgbClr val="596A57"/>
-              </a:solidFill>
-              <a:effectLst/>
-              <a:uLnTx/>
-              <a:uFillTx/>
-              <a:latin typeface="Arial"/>
-              <a:ea typeface="+mn-ea"/>
-              <a:cs typeface="+mn-cs"/>
-            </a:endParaRPr>
+            <a:endParaRPr lang="da-DK" dirty="0"/>
           </a:p>
         </p:txBody>
       </p:sp>
@@ -26278,13 +26040,13 @@
           <p:nvPr/>
         </p:nvPicPr>
         <p:blipFill>
-          <a:blip r:embed="rId9">
+          <a:blip r:embed="rId10">
             <a:extLst>
               <a:ext uri="{28A0092B-C50C-407E-A947-70E740481C1C}">
                 <a14:useLocalDpi xmlns:a14="http://schemas.microsoft.com/office/drawing/2010/main" val="0"/>
               </a:ext>
               <a:ext uri="{96DAC541-7B7A-43D3-8B79-37D633B846F1}">
-                <asvg:svgBlip xmlns:asvg="http://schemas.microsoft.com/office/drawing/2016/SVG/main" r:embed="rId10"/>
+                <asvg:svgBlip xmlns:asvg="http://schemas.microsoft.com/office/drawing/2016/SVG/main" r:embed="rId11"/>
               </a:ext>
             </a:extLst>
           </a:blip>
@@ -26305,7 +26067,7 @@
     </p:spTree>
     <p:extLst>
       <p:ext uri="{BB962C8B-B14F-4D97-AF65-F5344CB8AC3E}">
-        <p14:creationId xmlns:p14="http://schemas.microsoft.com/office/powerpoint/2010/main" val="3158517293"/>
+        <p14:creationId xmlns:p14="http://schemas.microsoft.com/office/powerpoint/2010/main" val="3928050306"/>
       </p:ext>
     </p:extLst>
   </p:cSld>
@@ -26539,49 +26301,6 @@
           <a:p>
             <a:pPr lvl="2"/>
             <a:r>
-              <a:rPr lang="en-GB" dirty="0" err="1"/>
-              <a:t>Når</a:t>
-            </a:r>
-            <a:r>
-              <a:rPr lang="en-GB" dirty="0"/>
-              <a:t> der </a:t>
-            </a:r>
-            <a:r>
-              <a:rPr lang="en-GB" dirty="0" err="1"/>
-              <a:t>refereres</a:t>
-            </a:r>
-            <a:r>
-              <a:rPr lang="en-GB" dirty="0"/>
-              <a:t> </a:t>
-            </a:r>
-            <a:r>
-              <a:rPr lang="en-GB" dirty="0" err="1"/>
-              <a:t>til</a:t>
-            </a:r>
-            <a:r>
-              <a:rPr lang="en-GB" dirty="0"/>
-              <a:t> [SUFFIX] </a:t>
-            </a:r>
-            <a:r>
-              <a:rPr lang="en-GB" dirty="0" err="1"/>
-              <a:t>i</a:t>
-            </a:r>
-            <a:r>
-              <a:rPr lang="en-GB" dirty="0"/>
-              <a:t> lab (</a:t>
-            </a:r>
-            <a:r>
-              <a:rPr lang="en-GB" dirty="0" err="1"/>
-              <a:t>fabmedical</a:t>
-            </a:r>
-            <a:r>
-              <a:rPr lang="en-GB" dirty="0"/>
-              <a:t>-[SUFFIX]).  </a:t>
-            </a:r>
-          </a:p>
-          <a:p>
-            <a:pPr lvl="2"/>
-            <a:r>
               <a:rPr lang="en-GB" dirty="0"/>
               <a:t>[SHORT_SUFFIX] </a:t>
             </a:r>
@@ -26822,6 +26541,118 @@
             </a:r>
           </a:p>
           <a:p>
+            <a:pPr lvl="2"/>
+            <a:r>
+              <a:rPr lang="en-GB" dirty="0" err="1"/>
+              <a:t>az</a:t>
+            </a:r>
+            <a:r>
+              <a:rPr lang="en-GB" dirty="0"/>
+              <a:t> </a:t>
+            </a:r>
+            <a:r>
+              <a:rPr lang="en-GB" dirty="0" err="1"/>
+              <a:t>vm</a:t>
+            </a:r>
+            <a:r>
+              <a:rPr lang="en-GB" dirty="0"/>
+              <a:t> show -d -g </a:t>
+            </a:r>
+            <a:r>
+              <a:rPr lang="en-GB" dirty="0" err="1"/>
+              <a:t>fabmedical</a:t>
+            </a:r>
+            <a:r>
+              <a:rPr lang="en-GB" dirty="0"/>
+              <a:t>-[SUFFIX] -n </a:t>
+            </a:r>
+            <a:r>
+              <a:rPr lang="en-GB" dirty="0" err="1"/>
+              <a:t>fabmedical</a:t>
+            </a:r>
+            <a:r>
+              <a:rPr lang="en-GB" dirty="0"/>
+              <a:t>-[SHORT_SUFFIX] --query </a:t>
+            </a:r>
+            <a:r>
+              <a:rPr lang="en-GB" dirty="0" err="1"/>
+              <a:t>publicIps</a:t>
+            </a:r>
+            <a:r>
+              <a:rPr lang="en-GB" dirty="0"/>
+              <a:t> -o </a:t>
+            </a:r>
+            <a:r>
+              <a:rPr lang="en-GB" dirty="0" err="1"/>
+              <a:t>tsv</a:t>
+            </a:r>
+            <a:r>
+              <a:rPr lang="en-GB" dirty="0"/>
+              <a:t> </a:t>
+            </a:r>
+            <a:r>
+              <a:rPr lang="en-GB" dirty="0" err="1"/>
+              <a:t>skal</a:t>
+            </a:r>
+            <a:r>
+              <a:rPr lang="en-GB" dirty="0"/>
+              <a:t> </a:t>
+            </a:r>
+            <a:r>
+              <a:rPr lang="en-GB" dirty="0" err="1"/>
+              <a:t>være</a:t>
+            </a:r>
+            <a:endParaRPr lang="en-GB" dirty="0"/>
+          </a:p>
+          <a:p>
+            <a:pPr lvl="2"/>
+            <a:r>
+              <a:rPr lang="en-GB" dirty="0" err="1"/>
+              <a:t>az</a:t>
+            </a:r>
+            <a:r>
+              <a:rPr lang="en-GB" dirty="0"/>
+              <a:t> </a:t>
+            </a:r>
+            <a:r>
+              <a:rPr lang="en-GB" dirty="0" err="1"/>
+              <a:t>vm</a:t>
+            </a:r>
+            <a:r>
+              <a:rPr lang="en-GB" dirty="0"/>
+              <a:t> show -d -g </a:t>
+            </a:r>
+            <a:r>
+              <a:rPr lang="en-GB" dirty="0" err="1"/>
+              <a:t>fabmedical</a:t>
+            </a:r>
+            <a:r>
+              <a:rPr lang="en-GB" dirty="0"/>
+              <a:t>-[SUFFIX] -n </a:t>
+            </a:r>
+            <a:r>
+              <a:rPr lang="en-GB" dirty="0" err="1"/>
+              <a:t>fabmedical</a:t>
+            </a:r>
+            <a:r>
+              <a:rPr lang="en-GB" dirty="0"/>
+              <a:t> --query </a:t>
+            </a:r>
+            <a:r>
+              <a:rPr lang="en-GB" dirty="0" err="1"/>
+              <a:t>publicIps</a:t>
+            </a:r>
+            <a:r>
+              <a:rPr lang="en-GB" dirty="0"/>
+              <a:t> -o </a:t>
+            </a:r>
+            <a:r>
+              <a:rPr lang="en-GB" dirty="0" err="1"/>
+              <a:t>tsv</a:t>
+            </a:r>
+            <a:endParaRPr lang="da-DK" dirty="0"/>
+          </a:p>
+          <a:p>
             <a:r>
               <a:rPr lang="da-DK" dirty="0" err="1"/>
               <a:t>Exercise</a:t>
@@ -26842,16 +26673,7 @@
             <a:pPr lvl="2"/>
             <a:r>
               <a:rPr lang="da-DK" dirty="0"/>
-              <a:t>Trin 16</a:t>
-            </a:r>
-          </a:p>
-          <a:p>
-            <a:pPr marL="360000" lvl="2" indent="0">
-              <a:buNone/>
-            </a:pPr>
-            <a:r>
-              <a:rPr lang="da-DK" dirty="0"/>
-              <a:t>Hvis der er problemer med at få eksporteret en gyldig </a:t>
+              <a:t>Trin 16: Hvis der er problemer med at få eksporteret en gyldig </a:t>
             </a:r>
             <a:r>
               <a:rPr lang="da-DK" dirty="0" err="1"/>
@@ -26903,50 +26725,11 @@
           <a:bodyPr/>
           <a:lstStyle/>
           <a:p>
-            <a:pPr marL="0" marR="0" lvl="0" indent="0" algn="l" defTabSz="914400" rtl="0" eaLnBrk="1" fontAlgn="auto" latinLnBrk="0" hangingPunct="1">
-              <a:lnSpc>
-                <a:spcPct val="100000"/>
-              </a:lnSpc>
-              <a:spcBef>
-                <a:spcPts val="0"/>
-              </a:spcBef>
-              <a:spcAft>
-                <a:spcPts val="0"/>
-              </a:spcAft>
-              <a:buClrTx/>
-              <a:buSzTx/>
-              <a:buFontTx/>
-              <a:buNone/>
-              <a:tabLst/>
-              <a:defRPr/>
-            </a:pPr>
-            <a:r>
-              <a:rPr kumimoji="0" lang="da-DK" sz="100" b="0" i="0" u="none" strike="noStrike" kern="1200" cap="none" spc="0" normalizeH="0" baseline="0" noProof="0">
-                <a:ln>
-                  <a:noFill/>
-                </a:ln>
-                <a:noFill/>
-                <a:effectLst/>
-                <a:uLnTx/>
-                <a:uFillTx/>
-                <a:latin typeface="Arial"/>
-                <a:ea typeface="+mn-ea"/>
-                <a:cs typeface="+mn-cs"/>
-              </a:rPr>
+            <a:r>
+              <a:rPr lang="da-DK"/>
               <a:t>Lokation, 23-10-2019</a:t>
             </a:r>
-            <a:endParaRPr kumimoji="0" lang="da-DK" sz="100" b="0" i="0" u="none" strike="noStrike" kern="1200" cap="none" spc="0" normalizeH="0" baseline="0" noProof="0" dirty="0">
-              <a:ln>
-                <a:noFill/>
-              </a:ln>
-              <a:noFill/>
-              <a:effectLst/>
-              <a:uLnTx/>
-              <a:uFillTx/>
-              <a:latin typeface="Arial"/>
-              <a:ea typeface="+mn-ea"/>
-              <a:cs typeface="+mn-cs"/>
-            </a:endParaRPr>
+            <a:endParaRPr lang="da-DK" dirty="0"/>
           </a:p>
         </p:txBody>
       </p:sp>
@@ -26971,50 +26754,11 @@
           <a:bodyPr/>
           <a:lstStyle/>
           <a:p>
-            <a:pPr marL="0" marR="0" lvl="0" indent="0" algn="l" defTabSz="914400" rtl="0" eaLnBrk="1" fontAlgn="auto" latinLnBrk="0" hangingPunct="1">
-              <a:lnSpc>
-                <a:spcPct val="100000"/>
-              </a:lnSpc>
-              <a:spcBef>
-                <a:spcPts val="0"/>
-              </a:spcBef>
-              <a:spcAft>
-                <a:spcPts val="0"/>
-              </a:spcAft>
-              <a:buClrTx/>
-              <a:buSzTx/>
-              <a:buFontTx/>
-              <a:buNone/>
-              <a:tabLst/>
-              <a:defRPr/>
-            </a:pPr>
-            <a:r>
-              <a:rPr kumimoji="0" lang="da-DK" sz="100" b="0" i="0" u="none" strike="noStrike" kern="1200" cap="none" spc="0" normalizeH="0" baseline="0" noProof="0">
-                <a:ln>
-                  <a:noFill/>
-                </a:ln>
-                <a:noFill/>
-                <a:effectLst/>
-                <a:uLnTx/>
-                <a:uFillTx/>
-                <a:latin typeface="Arial"/>
-                <a:ea typeface="+mn-ea"/>
-                <a:cs typeface="+mn-cs"/>
-              </a:rPr>
+            <a:r>
+              <a:rPr lang="da-DK"/>
               <a:t>Kunde_immeo</a:t>
             </a:r>
-            <a:endParaRPr kumimoji="0" lang="da-DK" sz="100" b="0" i="0" u="none" strike="noStrike" kern="1200" cap="none" spc="0" normalizeH="0" baseline="0" noProof="0" dirty="0">
-              <a:ln>
-                <a:noFill/>
-              </a:ln>
-              <a:noFill/>
-              <a:effectLst/>
-              <a:uLnTx/>
-              <a:uFillTx/>
-              <a:latin typeface="Arial"/>
-              <a:ea typeface="+mn-ea"/>
-              <a:cs typeface="+mn-cs"/>
-            </a:endParaRPr>
+            <a:endParaRPr lang="da-DK" dirty="0"/>
           </a:p>
         </p:txBody>
       </p:sp>
@@ -27039,88 +26783,16 @@
           <a:bodyPr/>
           <a:lstStyle/>
           <a:p>
-            <a:pPr marL="0" marR="0" lvl="0" indent="0" algn="l" defTabSz="914400" rtl="0" eaLnBrk="1" fontAlgn="auto" latinLnBrk="0" hangingPunct="1">
-              <a:lnSpc>
-                <a:spcPct val="100000"/>
-              </a:lnSpc>
-              <a:spcBef>
-                <a:spcPts val="0"/>
-              </a:spcBef>
-              <a:spcAft>
-                <a:spcPts val="0"/>
-              </a:spcAft>
-              <a:buClrTx/>
-              <a:buSzTx/>
-              <a:buFontTx/>
-              <a:buNone/>
-              <a:tabLst/>
-              <a:defRPr/>
-            </a:pPr>
-            <a:r>
-              <a:rPr kumimoji="0" lang="da-DK" sz="800" b="0" i="0" u="none" strike="noStrike" kern="1200" cap="none" spc="0" normalizeH="0" baseline="0" noProof="0">
-                <a:ln>
-                  <a:noFill/>
-                </a:ln>
-                <a:solidFill>
-                  <a:srgbClr val="596A57"/>
-                </a:solidFill>
-                <a:effectLst/>
-                <a:uLnTx/>
-                <a:uFillTx/>
-                <a:latin typeface="Arial"/>
-                <a:ea typeface="+mn-ea"/>
-                <a:cs typeface="+mn-cs"/>
-              </a:rPr>
+            <a:r>
+              <a:rPr lang="da-DK"/>
               <a:t>s.</a:t>
             </a:r>
             <a:fld id="{24C8C45C-947F-4981-8B3F-4F32E973C901}" type="slidenum">
-              <a:rPr kumimoji="0" lang="da-DK" sz="800" b="0" i="0" u="none" strike="noStrike" kern="1200" cap="none" spc="0" normalizeH="0" baseline="0" noProof="0" smtClean="0">
-                <a:ln>
-                  <a:noFill/>
-                </a:ln>
-                <a:solidFill>
-                  <a:srgbClr val="596A57"/>
-                </a:solidFill>
-                <a:effectLst/>
-                <a:uLnTx/>
-                <a:uFillTx/>
-                <a:latin typeface="Arial"/>
-                <a:ea typeface="+mn-ea"/>
-                <a:cs typeface="+mn-cs"/>
-              </a:rPr>
-              <a:pPr marL="0" marR="0" lvl="0" indent="0" algn="l" defTabSz="914400" rtl="0" eaLnBrk="1" fontAlgn="auto" latinLnBrk="0" hangingPunct="1">
-                <a:lnSpc>
-                  <a:spcPct val="100000"/>
-                </a:lnSpc>
-                <a:spcBef>
-                  <a:spcPts val="0"/>
-                </a:spcBef>
-                <a:spcAft>
-                  <a:spcPts val="0"/>
-                </a:spcAft>
-                <a:buClrTx/>
-                <a:buSzTx/>
-                <a:buFontTx/>
-                <a:buNone/>
-                <a:tabLst/>
-                <a:defRPr/>
-              </a:pPr>
+              <a:rPr lang="da-DK" smtClean="0"/>
+              <a:pPr/>
               <a:t>6</a:t>
             </a:fld>
-            <a:endParaRPr kumimoji="0" lang="da-DK" sz="800" b="0" i="0" u="none" strike="noStrike" kern="1200" cap="none" spc="0" normalizeH="0" baseline="0" noProof="0" dirty="0">
-              <a:ln>
-                <a:noFill/>
-              </a:ln>
-              <a:solidFill>
-                <a:srgbClr val="596A57"/>
-              </a:solidFill>
-              <a:effectLst/>
-              <a:uLnTx/>
-              <a:uFillTx/>
-              <a:latin typeface="Arial"/>
-              <a:ea typeface="+mn-ea"/>
-              <a:cs typeface="+mn-cs"/>
-            </a:endParaRPr>
+            <a:endParaRPr lang="da-DK" dirty="0"/>
           </a:p>
         </p:txBody>
       </p:sp>

</xml_diff>